<commit_message>
pushing dropbox to git
</commit_message>
<xml_diff>
--- a/Machine Learning Bootcamp Sciprog.pptx
+++ b/Machine Learning Bootcamp Sciprog.pptx
@@ -7,13 +7,16 @@
   <p:sldIdLst>
     <p:sldId id="256" r:id="rId2"/>
     <p:sldId id="257" r:id="rId3"/>
-    <p:sldId id="258" r:id="rId4"/>
-    <p:sldId id="264" r:id="rId5"/>
-    <p:sldId id="259" r:id="rId6"/>
-    <p:sldId id="261" r:id="rId7"/>
-    <p:sldId id="263" r:id="rId8"/>
-    <p:sldId id="262" r:id="rId9"/>
-    <p:sldId id="260" r:id="rId10"/>
+    <p:sldId id="265" r:id="rId4"/>
+    <p:sldId id="258" r:id="rId5"/>
+    <p:sldId id="264" r:id="rId6"/>
+    <p:sldId id="259" r:id="rId7"/>
+    <p:sldId id="261" r:id="rId8"/>
+    <p:sldId id="266" r:id="rId9"/>
+    <p:sldId id="263" r:id="rId10"/>
+    <p:sldId id="267" r:id="rId11"/>
+    <p:sldId id="262" r:id="rId12"/>
+    <p:sldId id="260" r:id="rId13"/>
   </p:sldIdLst>
   <p:sldSz cx="12192000" cy="6858000"/>
   <p:notesSz cx="6858000" cy="9144000"/>
@@ -842,7 +845,7 @@
           <a:p>
             <a:fld id="{23175A75-2CF1-4C45-B6A5-C91C39D7C608}" type="datetimeFigureOut">
               <a:rPr lang="en-US" smtClean="0"/>
-              <a:t>11/1/2016</a:t>
+              <a:t>11/10/16</a:t>
             </a:fld>
             <a:endParaRPr lang="en-US"/>
           </a:p>
@@ -1093,7 +1096,7 @@
           <a:p>
             <a:fld id="{23175A75-2CF1-4C45-B6A5-C91C39D7C608}" type="datetimeFigureOut">
               <a:rPr lang="en-US" smtClean="0"/>
-              <a:t>11/1/2016</a:t>
+              <a:t>11/10/16</a:t>
             </a:fld>
             <a:endParaRPr lang="en-US"/>
           </a:p>
@@ -1407,7 +1410,7 @@
           <a:p>
             <a:fld id="{23175A75-2CF1-4C45-B6A5-C91C39D7C608}" type="datetimeFigureOut">
               <a:rPr lang="en-US" smtClean="0"/>
-              <a:t>11/1/2016</a:t>
+              <a:t>11/10/16</a:t>
             </a:fld>
             <a:endParaRPr lang="en-US"/>
           </a:p>
@@ -1748,7 +1751,7 @@
           <a:p>
             <a:fld id="{23175A75-2CF1-4C45-B6A5-C91C39D7C608}" type="datetimeFigureOut">
               <a:rPr lang="en-US" smtClean="0"/>
-              <a:t>11/1/2016</a:t>
+              <a:t>11/10/16</a:t>
             </a:fld>
             <a:endParaRPr lang="en-US"/>
           </a:p>
@@ -2062,7 +2065,7 @@
           <a:p>
             <a:fld id="{23175A75-2CF1-4C45-B6A5-C91C39D7C608}" type="datetimeFigureOut">
               <a:rPr lang="en-US" smtClean="0"/>
-              <a:t>11/1/2016</a:t>
+              <a:t>11/10/16</a:t>
             </a:fld>
             <a:endParaRPr lang="en-US"/>
           </a:p>
@@ -2455,7 +2458,7 @@
           <a:p>
             <a:fld id="{23175A75-2CF1-4C45-B6A5-C91C39D7C608}" type="datetimeFigureOut">
               <a:rPr lang="en-US" smtClean="0"/>
-              <a:t>11/1/2016</a:t>
+              <a:t>11/10/16</a:t>
             </a:fld>
             <a:endParaRPr lang="en-US"/>
           </a:p>
@@ -2625,7 +2628,7 @@
           <a:p>
             <a:fld id="{23175A75-2CF1-4C45-B6A5-C91C39D7C608}" type="datetimeFigureOut">
               <a:rPr lang="en-US" smtClean="0"/>
-              <a:t>11/1/2016</a:t>
+              <a:t>11/10/16</a:t>
             </a:fld>
             <a:endParaRPr lang="en-US"/>
           </a:p>
@@ -2805,7 +2808,7 @@
           <a:p>
             <a:fld id="{23175A75-2CF1-4C45-B6A5-C91C39D7C608}" type="datetimeFigureOut">
               <a:rPr lang="en-US" smtClean="0"/>
-              <a:t>11/1/2016</a:t>
+              <a:t>11/10/16</a:t>
             </a:fld>
             <a:endParaRPr lang="en-US"/>
           </a:p>
@@ -2981,7 +2984,7 @@
           <a:p>
             <a:fld id="{23175A75-2CF1-4C45-B6A5-C91C39D7C608}" type="datetimeFigureOut">
               <a:rPr lang="en-US" smtClean="0"/>
-              <a:t>11/1/2016</a:t>
+              <a:t>11/10/16</a:t>
             </a:fld>
             <a:endParaRPr lang="en-US"/>
           </a:p>
@@ -3228,7 +3231,7 @@
           <a:p>
             <a:fld id="{23175A75-2CF1-4C45-B6A5-C91C39D7C608}" type="datetimeFigureOut">
               <a:rPr lang="en-US" smtClean="0"/>
-              <a:t>11/1/2016</a:t>
+              <a:t>11/10/16</a:t>
             </a:fld>
             <a:endParaRPr lang="en-US"/>
           </a:p>
@@ -3460,7 +3463,7 @@
           <a:p>
             <a:fld id="{23175A75-2CF1-4C45-B6A5-C91C39D7C608}" type="datetimeFigureOut">
               <a:rPr lang="en-US" smtClean="0"/>
-              <a:t>11/1/2016</a:t>
+              <a:t>11/10/16</a:t>
             </a:fld>
             <a:endParaRPr lang="en-US"/>
           </a:p>
@@ -3834,7 +3837,7 @@
           <a:p>
             <a:fld id="{23175A75-2CF1-4C45-B6A5-C91C39D7C608}" type="datetimeFigureOut">
               <a:rPr lang="en-US" smtClean="0"/>
-              <a:t>11/1/2016</a:t>
+              <a:t>11/10/16</a:t>
             </a:fld>
             <a:endParaRPr lang="en-US"/>
           </a:p>
@@ -3957,7 +3960,7 @@
           <a:p>
             <a:fld id="{23175A75-2CF1-4C45-B6A5-C91C39D7C608}" type="datetimeFigureOut">
               <a:rPr lang="en-US" smtClean="0"/>
-              <a:t>11/1/2016</a:t>
+              <a:t>11/10/16</a:t>
             </a:fld>
             <a:endParaRPr lang="en-US"/>
           </a:p>
@@ -4052,7 +4055,7 @@
           <a:p>
             <a:fld id="{23175A75-2CF1-4C45-B6A5-C91C39D7C608}" type="datetimeFigureOut">
               <a:rPr lang="en-US" smtClean="0"/>
-              <a:t>11/1/2016</a:t>
+              <a:t>11/10/16</a:t>
             </a:fld>
             <a:endParaRPr lang="en-US"/>
           </a:p>
@@ -4307,7 +4310,7 @@
           <a:p>
             <a:fld id="{23175A75-2CF1-4C45-B6A5-C91C39D7C608}" type="datetimeFigureOut">
               <a:rPr lang="en-US" smtClean="0"/>
-              <a:t>11/1/2016</a:t>
+              <a:t>11/10/16</a:t>
             </a:fld>
             <a:endParaRPr lang="en-US"/>
           </a:p>
@@ -4570,7 +4573,7 @@
           <a:p>
             <a:fld id="{23175A75-2CF1-4C45-B6A5-C91C39D7C608}" type="datetimeFigureOut">
               <a:rPr lang="en-US" smtClean="0"/>
-              <a:t>11/1/2016</a:t>
+              <a:t>11/10/16</a:t>
             </a:fld>
             <a:endParaRPr lang="en-US"/>
           </a:p>
@@ -5313,7 +5316,7 @@
           <a:p>
             <a:fld id="{23175A75-2CF1-4C45-B6A5-C91C39D7C608}" type="datetimeFigureOut">
               <a:rPr lang="en-US" smtClean="0"/>
-              <a:t>11/1/2016</a:t>
+              <a:t>11/10/16</a:t>
             </a:fld>
             <a:endParaRPr lang="en-US"/>
           </a:p>
@@ -5949,7 +5952,7 @@
 </p:sld>
 </file>
 
-<file path=ppt/slides/slide2.xml><?xml version="1.0" encoding="utf-8"?>
+<file path=ppt/slides/slide10.xml><?xml version="1.0" encoding="utf-8"?>
 <p:sld xmlns:a="http://schemas.openxmlformats.org/drawingml/2006/main" xmlns:r="http://schemas.openxmlformats.org/officeDocument/2006/relationships" xmlns:p="http://schemas.openxmlformats.org/presentationml/2006/main">
   <p:cSld>
     <p:spTree>
@@ -5982,9 +5985,10 @@
           <a:lstStyle/>
           <a:p>
             <a:r>
-              <a:rPr lang="en-US" dirty="0"/>
-              <a:t>Topics</a:t>
-            </a:r>
+              <a:rPr lang="en-US" dirty="0" smtClean="0"/>
+              <a:t>Multivariate regression</a:t>
+            </a:r>
+            <a:endParaRPr lang="en-US" dirty="0"/>
           </a:p>
         </p:txBody>
       </p:sp>
@@ -6004,51 +6008,9 @@
           <a:lstStyle/>
           <a:p>
             <a:r>
-              <a:rPr lang="en-US" dirty="0"/>
-              <a:t>What is Machine Learning?</a:t>
-            </a:r>
-          </a:p>
-          <a:p>
-            <a:r>
-              <a:rPr lang="en-US" dirty="0"/>
-              <a:t>Types of Machine Learning</a:t>
-            </a:r>
-          </a:p>
-          <a:p>
-            <a:pPr lvl="1"/>
-            <a:r>
-              <a:rPr lang="en-US" dirty="0"/>
-              <a:t>Regression</a:t>
-            </a:r>
-          </a:p>
-          <a:p>
-            <a:pPr lvl="1"/>
-            <a:r>
-              <a:rPr lang="en-US" dirty="0"/>
-              <a:t>Classification</a:t>
-            </a:r>
-          </a:p>
-          <a:p>
-            <a:r>
-              <a:rPr lang="en-US" dirty="0"/>
-              <a:t>Considerations</a:t>
-            </a:r>
-          </a:p>
-          <a:p>
-            <a:pPr lvl="1"/>
-            <a:r>
-              <a:rPr lang="en-US" dirty="0"/>
-              <a:t>Overfitting</a:t>
-            </a:r>
-          </a:p>
-          <a:p>
-            <a:pPr lvl="1"/>
-            <a:r>
-              <a:rPr lang="en-US" dirty="0"/>
-              <a:t>Regularizing</a:t>
-            </a:r>
-          </a:p>
-          <a:p>
+              <a:rPr lang="en-US" dirty="0" smtClean="0"/>
+              <a:t>Both of us look at this</a:t>
+            </a:r>
             <a:endParaRPr lang="en-US" dirty="0"/>
           </a:p>
         </p:txBody>
@@ -6056,7 +6018,7 @@
     </p:spTree>
     <p:extLst>
       <p:ext uri="{BB962C8B-B14F-4D97-AF65-F5344CB8AC3E}">
-        <p14:creationId xmlns:p14="http://schemas.microsoft.com/office/powerpoint/2010/main" val="3658882410"/>
+        <p14:creationId xmlns:p14="http://schemas.microsoft.com/office/powerpoint/2010/main" val="1380420511"/>
       </p:ext>
     </p:extLst>
   </p:cSld>
@@ -6066,589 +6028,7 @@
 </p:sld>
 </file>
 
-<file path=ppt/slides/slide3.xml><?xml version="1.0" encoding="utf-8"?>
-<p:sld xmlns:a="http://schemas.openxmlformats.org/drawingml/2006/main" xmlns:r="http://schemas.openxmlformats.org/officeDocument/2006/relationships" xmlns:p="http://schemas.openxmlformats.org/presentationml/2006/main">
-  <p:cSld>
-    <p:spTree>
-      <p:nvGrpSpPr>
-        <p:cNvPr id="1" name=""/>
-        <p:cNvGrpSpPr/>
-        <p:nvPr/>
-      </p:nvGrpSpPr>
-      <p:grpSpPr>
-        <a:xfrm>
-          <a:off x="0" y="0"/>
-          <a:ext cx="0" cy="0"/>
-          <a:chOff x="0" y="0"/>
-          <a:chExt cx="0" cy="0"/>
-        </a:xfrm>
-      </p:grpSpPr>
-      <p:sp>
-        <p:nvSpPr>
-          <p:cNvPr id="2" name="Title 1"/>
-          <p:cNvSpPr>
-            <a:spLocks noGrp="1"/>
-          </p:cNvSpPr>
-          <p:nvPr>
-            <p:ph type="title"/>
-          </p:nvPr>
-        </p:nvSpPr>
-        <p:spPr/>
-        <p:txBody>
-          <a:bodyPr/>
-          <a:lstStyle/>
-          <a:p>
-            <a:r>
-              <a:rPr lang="en-US" dirty="0"/>
-              <a:t>What is Machine Learning</a:t>
-            </a:r>
-          </a:p>
-        </p:txBody>
-      </p:sp>
-      <p:sp>
-        <p:nvSpPr>
-          <p:cNvPr id="3" name="Content Placeholder 2"/>
-          <p:cNvSpPr>
-            <a:spLocks noGrp="1"/>
-          </p:cNvSpPr>
-          <p:nvPr>
-            <p:ph idx="1"/>
-          </p:nvPr>
-        </p:nvSpPr>
-        <p:spPr/>
-        <p:txBody>
-          <a:bodyPr/>
-          <a:lstStyle/>
-          <a:p>
-            <a:r>
-              <a:rPr lang="en-US" dirty="0"/>
-              <a:t>Algorithms that improve performance through experience</a:t>
-            </a:r>
-          </a:p>
-        </p:txBody>
-      </p:sp>
-    </p:spTree>
-    <p:extLst>
-      <p:ext uri="{BB962C8B-B14F-4D97-AF65-F5344CB8AC3E}">
-        <p14:creationId xmlns:p14="http://schemas.microsoft.com/office/powerpoint/2010/main" val="2654504915"/>
-      </p:ext>
-    </p:extLst>
-  </p:cSld>
-  <p:clrMapOvr>
-    <a:masterClrMapping/>
-  </p:clrMapOvr>
-</p:sld>
-</file>
-
-<file path=ppt/slides/slide4.xml><?xml version="1.0" encoding="utf-8"?>
-<p:sld xmlns:a="http://schemas.openxmlformats.org/drawingml/2006/main" xmlns:r="http://schemas.openxmlformats.org/officeDocument/2006/relationships" xmlns:p="http://schemas.openxmlformats.org/presentationml/2006/main">
-  <p:cSld>
-    <p:spTree>
-      <p:nvGrpSpPr>
-        <p:cNvPr id="1" name=""/>
-        <p:cNvGrpSpPr/>
-        <p:nvPr/>
-      </p:nvGrpSpPr>
-      <p:grpSpPr>
-        <a:xfrm>
-          <a:off x="0" y="0"/>
-          <a:ext cx="0" cy="0"/>
-          <a:chOff x="0" y="0"/>
-          <a:chExt cx="0" cy="0"/>
-        </a:xfrm>
-      </p:grpSpPr>
-      <p:sp>
-        <p:nvSpPr>
-          <p:cNvPr id="2" name="Title 1"/>
-          <p:cNvSpPr>
-            <a:spLocks noGrp="1"/>
-          </p:cNvSpPr>
-          <p:nvPr>
-            <p:ph type="title"/>
-          </p:nvPr>
-        </p:nvSpPr>
-        <p:spPr/>
-        <p:txBody>
-          <a:bodyPr/>
-          <a:lstStyle/>
-          <a:p>
-            <a:r>
-              <a:rPr lang="en-US" dirty="0"/>
-              <a:t>What is Machine Learning</a:t>
-            </a:r>
-          </a:p>
-        </p:txBody>
-      </p:sp>
-      <p:sp>
-        <p:nvSpPr>
-          <p:cNvPr id="3" name="Content Placeholder 2"/>
-          <p:cNvSpPr>
-            <a:spLocks noGrp="1"/>
-          </p:cNvSpPr>
-          <p:nvPr>
-            <p:ph idx="1"/>
-          </p:nvPr>
-        </p:nvSpPr>
-        <p:spPr/>
-        <p:txBody>
-          <a:bodyPr/>
-          <a:lstStyle/>
-          <a:p>
-            <a:r>
-              <a:rPr lang="en-US" dirty="0"/>
-              <a:t>Some Terminology</a:t>
-            </a:r>
-          </a:p>
-          <a:p>
-            <a:pPr lvl="1"/>
-            <a:r>
-              <a:rPr lang="en-US" dirty="0"/>
-              <a:t>Input (x). This is the input data we feed into a ML model</a:t>
-            </a:r>
-          </a:p>
-          <a:p>
-            <a:pPr lvl="1"/>
-            <a:r>
-              <a:rPr lang="en-US" dirty="0"/>
-              <a:t>Target (t). These represent the “answers” to training</a:t>
-            </a:r>
-          </a:p>
-          <a:p>
-            <a:pPr lvl="1"/>
-            <a:r>
-              <a:rPr lang="en-US" dirty="0"/>
-              <a:t>Weights or parameters (w)</a:t>
-            </a:r>
-          </a:p>
-          <a:p>
-            <a:endParaRPr lang="en-US" dirty="0"/>
-          </a:p>
-          <a:p>
-            <a:endParaRPr lang="en-US" dirty="0"/>
-          </a:p>
-        </p:txBody>
-      </p:sp>
-    </p:spTree>
-    <p:extLst>
-      <p:ext uri="{BB962C8B-B14F-4D97-AF65-F5344CB8AC3E}">
-        <p14:creationId xmlns:p14="http://schemas.microsoft.com/office/powerpoint/2010/main" val="2985044466"/>
-      </p:ext>
-    </p:extLst>
-  </p:cSld>
-  <p:clrMapOvr>
-    <a:masterClrMapping/>
-  </p:clrMapOvr>
-</p:sld>
-</file>
-
-<file path=ppt/slides/slide5.xml><?xml version="1.0" encoding="utf-8"?>
-<p:sld xmlns:a="http://schemas.openxmlformats.org/drawingml/2006/main" xmlns:r="http://schemas.openxmlformats.org/officeDocument/2006/relationships" xmlns:p="http://schemas.openxmlformats.org/presentationml/2006/main">
-  <p:cSld>
-    <p:spTree>
-      <p:nvGrpSpPr>
-        <p:cNvPr id="1" name=""/>
-        <p:cNvGrpSpPr/>
-        <p:nvPr/>
-      </p:nvGrpSpPr>
-      <p:grpSpPr>
-        <a:xfrm>
-          <a:off x="0" y="0"/>
-          <a:ext cx="0" cy="0"/>
-          <a:chOff x="0" y="0"/>
-          <a:chExt cx="0" cy="0"/>
-        </a:xfrm>
-      </p:grpSpPr>
-      <p:sp>
-        <p:nvSpPr>
-          <p:cNvPr id="2" name="Title 1"/>
-          <p:cNvSpPr>
-            <a:spLocks noGrp="1"/>
-          </p:cNvSpPr>
-          <p:nvPr>
-            <p:ph type="title"/>
-          </p:nvPr>
-        </p:nvSpPr>
-        <p:spPr/>
-        <p:txBody>
-          <a:bodyPr/>
-          <a:lstStyle/>
-          <a:p>
-            <a:r>
-              <a:rPr lang="en-US" dirty="0"/>
-              <a:t>Types of Machine Learning</a:t>
-            </a:r>
-          </a:p>
-        </p:txBody>
-      </p:sp>
-    </p:spTree>
-    <p:extLst>
-      <p:ext uri="{BB962C8B-B14F-4D97-AF65-F5344CB8AC3E}">
-        <p14:creationId xmlns:p14="http://schemas.microsoft.com/office/powerpoint/2010/main" val="3378451331"/>
-      </p:ext>
-    </p:extLst>
-  </p:cSld>
-  <p:clrMapOvr>
-    <a:masterClrMapping/>
-  </p:clrMapOvr>
-</p:sld>
-</file>
-
-<file path=ppt/slides/slide6.xml><?xml version="1.0" encoding="utf-8"?>
-<p:sld xmlns:a="http://schemas.openxmlformats.org/drawingml/2006/main" xmlns:r="http://schemas.openxmlformats.org/officeDocument/2006/relationships" xmlns:p="http://schemas.openxmlformats.org/presentationml/2006/main">
-  <p:cSld>
-    <p:spTree>
-      <p:nvGrpSpPr>
-        <p:cNvPr id="1" name=""/>
-        <p:cNvGrpSpPr/>
-        <p:nvPr/>
-      </p:nvGrpSpPr>
-      <p:grpSpPr>
-        <a:xfrm>
-          <a:off x="0" y="0"/>
-          <a:ext cx="0" cy="0"/>
-          <a:chOff x="0" y="0"/>
-          <a:chExt cx="0" cy="0"/>
-        </a:xfrm>
-      </p:grpSpPr>
-      <p:sp>
-        <p:nvSpPr>
-          <p:cNvPr id="3" name="Title 2"/>
-          <p:cNvSpPr>
-            <a:spLocks noGrp="1"/>
-          </p:cNvSpPr>
-          <p:nvPr>
-            <p:ph type="title"/>
-          </p:nvPr>
-        </p:nvSpPr>
-        <p:spPr/>
-        <p:txBody>
-          <a:bodyPr/>
-          <a:lstStyle/>
-          <a:p>
-            <a:r>
-              <a:rPr lang="en-US" dirty="0"/>
-              <a:t>Regression</a:t>
-            </a:r>
-          </a:p>
-        </p:txBody>
-      </p:sp>
-      <p:sp>
-        <p:nvSpPr>
-          <p:cNvPr id="4" name="Content Placeholder 3"/>
-          <p:cNvSpPr>
-            <a:spLocks noGrp="1"/>
-          </p:cNvSpPr>
-          <p:nvPr>
-            <p:ph idx="1"/>
-          </p:nvPr>
-        </p:nvSpPr>
-        <p:spPr/>
-        <p:txBody>
-          <a:bodyPr/>
-          <a:lstStyle/>
-          <a:p>
-            <a:r>
-              <a:rPr lang="en-US" dirty="0"/>
-              <a:t>Like fitting a </a:t>
-            </a:r>
-            <a:r>
-              <a:rPr lang="en-US" dirty="0" err="1"/>
-              <a:t>trendline</a:t>
-            </a:r>
-            <a:r>
-              <a:rPr lang="en-US" dirty="0"/>
-              <a:t> through data points in Excel</a:t>
-            </a:r>
-          </a:p>
-          <a:p>
-            <a:r>
-              <a:rPr lang="en-US" dirty="0"/>
-              <a:t>We start with:</a:t>
-            </a:r>
-          </a:p>
-          <a:p>
-            <a:pPr lvl="1"/>
-            <a:r>
-              <a:rPr lang="en-US" dirty="0"/>
-              <a:t>Some existing points</a:t>
-            </a:r>
-          </a:p>
-          <a:p>
-            <a:pPr lvl="1"/>
-            <a:r>
-              <a:rPr lang="en-US" dirty="0"/>
-              <a:t>An estimate of the model structure (polynomial, sinusoid, other)</a:t>
-            </a:r>
-          </a:p>
-          <a:p>
-            <a:pPr lvl="2"/>
-            <a:r>
-              <a:rPr lang="en-US" dirty="0"/>
-              <a:t>I.E. y = mx + b. More generally: y = w</a:t>
-            </a:r>
-            <a:r>
-              <a:rPr lang="en-US" baseline="-25000" dirty="0"/>
-              <a:t>0</a:t>
-            </a:r>
-            <a:r>
-              <a:rPr lang="en-US" dirty="0"/>
-              <a:t> + w</a:t>
-            </a:r>
-            <a:r>
-              <a:rPr lang="en-US" baseline="-25000" dirty="0"/>
-              <a:t>1</a:t>
-            </a:r>
-            <a:r>
-              <a:rPr lang="en-US" dirty="0"/>
-              <a:t>x + w</a:t>
-            </a:r>
-            <a:r>
-              <a:rPr lang="en-US" baseline="-25000" dirty="0"/>
-              <a:t>2</a:t>
-            </a:r>
-            <a:r>
-              <a:rPr lang="en-US" dirty="0"/>
-              <a:t>x</a:t>
-            </a:r>
-            <a:r>
-              <a:rPr lang="en-US" baseline="30000" dirty="0"/>
-              <a:t>2</a:t>
-            </a:r>
-            <a:r>
-              <a:rPr lang="en-US" dirty="0"/>
-              <a:t> + w</a:t>
-            </a:r>
-            <a:r>
-              <a:rPr lang="en-US" baseline="-25000" dirty="0"/>
-              <a:t>3</a:t>
-            </a:r>
-            <a:r>
-              <a:rPr lang="en-US" dirty="0"/>
-              <a:t>x</a:t>
-            </a:r>
-            <a:r>
-              <a:rPr lang="en-US" baseline="30000" dirty="0"/>
-              <a:t>3</a:t>
-            </a:r>
-            <a:r>
-              <a:rPr lang="en-US" dirty="0"/>
-              <a:t> + … </a:t>
-            </a:r>
-            <a:r>
-              <a:rPr lang="en-US" dirty="0" err="1"/>
-              <a:t>w</a:t>
-            </a:r>
-            <a:r>
-              <a:rPr lang="en-US" baseline="-25000" dirty="0" err="1"/>
-              <a:t>n</a:t>
-            </a:r>
-            <a:r>
-              <a:rPr lang="en-US" dirty="0" err="1"/>
-              <a:t>x</a:t>
-            </a:r>
-            <a:r>
-              <a:rPr lang="en-US" baseline="30000" dirty="0" err="1"/>
-              <a:t>n</a:t>
-            </a:r>
-            <a:endParaRPr lang="en-US" dirty="0"/>
-          </a:p>
-          <a:p>
-            <a:r>
-              <a:rPr lang="en-US" dirty="0"/>
-              <a:t>We let the ML model determine the optimal weight values to solve our system</a:t>
-            </a:r>
-          </a:p>
-        </p:txBody>
-      </p:sp>
-      <p:pic>
-        <p:nvPicPr>
-          <p:cNvPr id="1026" name="Picture 2" descr="Linear regression.svg"/>
-          <p:cNvPicPr>
-            <a:picLocks noChangeAspect="1" noChangeArrowheads="1"/>
-          </p:cNvPicPr>
-          <p:nvPr/>
-        </p:nvPicPr>
-        <p:blipFill>
-          <a:blip r:embed="rId2">
-            <a:extLst>
-              <a:ext uri="{28A0092B-C50C-407E-A947-70E740481C1C}">
-                <a14:useLocalDpi xmlns:a14="http://schemas.microsoft.com/office/drawing/2010/main" val="0"/>
-              </a:ext>
-            </a:extLst>
-          </a:blip>
-          <a:srcRect/>
-          <a:stretch>
-            <a:fillRect/>
-          </a:stretch>
-        </p:blipFill>
-        <p:spPr bwMode="auto">
-          <a:xfrm>
-            <a:off x="6491804" y="1470026"/>
-            <a:ext cx="2926690" cy="1928956"/>
-          </a:xfrm>
-          <a:prstGeom prst="rect">
-            <a:avLst/>
-          </a:prstGeom>
-          <a:noFill/>
-          <a:extLst>
-            <a:ext uri="{909E8E84-426E-40DD-AFC4-6F175D3DCCD1}">
-              <a14:hiddenFill xmlns:a14="http://schemas.microsoft.com/office/drawing/2010/main">
-                <a:solidFill>
-                  <a:srgbClr val="FFFFFF"/>
-                </a:solidFill>
-              </a14:hiddenFill>
-            </a:ext>
-          </a:extLst>
-        </p:spPr>
-      </p:pic>
-    </p:spTree>
-    <p:extLst>
-      <p:ext uri="{BB962C8B-B14F-4D97-AF65-F5344CB8AC3E}">
-        <p14:creationId xmlns:p14="http://schemas.microsoft.com/office/powerpoint/2010/main" val="3671682612"/>
-      </p:ext>
-    </p:extLst>
-  </p:cSld>
-  <p:clrMapOvr>
-    <a:masterClrMapping/>
-  </p:clrMapOvr>
-</p:sld>
-</file>
-
-<file path=ppt/slides/slide7.xml><?xml version="1.0" encoding="utf-8"?>
-<p:sld xmlns:a="http://schemas.openxmlformats.org/drawingml/2006/main" xmlns:r="http://schemas.openxmlformats.org/officeDocument/2006/relationships" xmlns:p="http://schemas.openxmlformats.org/presentationml/2006/main">
-  <p:cSld>
-    <p:spTree>
-      <p:nvGrpSpPr>
-        <p:cNvPr id="1" name=""/>
-        <p:cNvGrpSpPr/>
-        <p:nvPr/>
-      </p:nvGrpSpPr>
-      <p:grpSpPr>
-        <a:xfrm>
-          <a:off x="0" y="0"/>
-          <a:ext cx="0" cy="0"/>
-          <a:chOff x="0" y="0"/>
-          <a:chExt cx="0" cy="0"/>
-        </a:xfrm>
-      </p:grpSpPr>
-      <p:sp>
-        <p:nvSpPr>
-          <p:cNvPr id="2" name="Title 1"/>
-          <p:cNvSpPr>
-            <a:spLocks noGrp="1"/>
-          </p:cNvSpPr>
-          <p:nvPr>
-            <p:ph type="title"/>
-          </p:nvPr>
-        </p:nvSpPr>
-        <p:spPr/>
-        <p:txBody>
-          <a:bodyPr/>
-          <a:lstStyle/>
-          <a:p>
-            <a:r>
-              <a:rPr lang="en-US" dirty="0"/>
-              <a:t>Regression: Overfitting</a:t>
-            </a:r>
-          </a:p>
-        </p:txBody>
-      </p:sp>
-      <p:sp>
-        <p:nvSpPr>
-          <p:cNvPr id="3" name="Content Placeholder 2"/>
-          <p:cNvSpPr>
-            <a:spLocks noGrp="1"/>
-          </p:cNvSpPr>
-          <p:nvPr>
-            <p:ph idx="1"/>
-          </p:nvPr>
-        </p:nvSpPr>
-        <p:spPr/>
-        <p:txBody>
-          <a:bodyPr/>
-          <a:lstStyle/>
-          <a:p>
-            <a:r>
-              <a:rPr lang="en-US" dirty="0"/>
-              <a:t>Why not use the highest order polynomial possible?</a:t>
-            </a:r>
-          </a:p>
-          <a:p>
-            <a:pPr lvl="1"/>
-            <a:r>
-              <a:rPr lang="en-US" dirty="0"/>
-              <a:t>Overfitting!</a:t>
-            </a:r>
-          </a:p>
-          <a:p>
-            <a:pPr lvl="1"/>
-            <a:r>
-              <a:rPr lang="en-US" dirty="0"/>
-              <a:t>We might fit the training data really well with a large order polynomial</a:t>
-            </a:r>
-          </a:p>
-          <a:p>
-            <a:pPr lvl="1"/>
-            <a:r>
-              <a:rPr lang="en-US" dirty="0"/>
-              <a:t>However the model may perform poorly against its test data</a:t>
-            </a:r>
-          </a:p>
-        </p:txBody>
-      </p:sp>
-      <p:pic>
-        <p:nvPicPr>
-          <p:cNvPr id="2050" name="Picture 2" descr="../_images/plot_underfitting_overfitting_0011.png"/>
-          <p:cNvPicPr>
-            <a:picLocks noChangeAspect="1" noChangeArrowheads="1"/>
-          </p:cNvPicPr>
-          <p:nvPr/>
-        </p:nvPicPr>
-        <p:blipFill rotWithShape="1">
-          <a:blip r:embed="rId2">
-            <a:extLst>
-              <a:ext uri="{28A0092B-C50C-407E-A947-70E740481C1C}">
-                <a14:useLocalDpi xmlns:a14="http://schemas.microsoft.com/office/drawing/2010/main" val="0"/>
-              </a:ext>
-            </a:extLst>
-          </a:blip>
-          <a:srcRect l="9351" r="7306"/>
-          <a:stretch/>
-        </p:blipFill>
-        <p:spPr bwMode="auto">
-          <a:xfrm>
-            <a:off x="677334" y="3978572"/>
-            <a:ext cx="7288497" cy="2498626"/>
-          </a:xfrm>
-          <a:prstGeom prst="rect">
-            <a:avLst/>
-          </a:prstGeom>
-          <a:noFill/>
-          <a:extLst>
-            <a:ext uri="{909E8E84-426E-40DD-AFC4-6F175D3DCCD1}">
-              <a14:hiddenFill xmlns:a14="http://schemas.microsoft.com/office/drawing/2010/main">
-                <a:solidFill>
-                  <a:srgbClr val="FFFFFF"/>
-                </a:solidFill>
-              </a14:hiddenFill>
-            </a:ext>
-          </a:extLst>
-        </p:spPr>
-      </p:pic>
-    </p:spTree>
-    <p:extLst>
-      <p:ext uri="{BB962C8B-B14F-4D97-AF65-F5344CB8AC3E}">
-        <p14:creationId xmlns:p14="http://schemas.microsoft.com/office/powerpoint/2010/main" val="2924641550"/>
-      </p:ext>
-    </p:extLst>
-  </p:cSld>
-  <p:clrMapOvr>
-    <a:masterClrMapping/>
-  </p:clrMapOvr>
-</p:sld>
-</file>
-
-<file path=ppt/slides/slide8.xml><?xml version="1.0" encoding="utf-8"?>
+<file path=ppt/slides/slide11.xml><?xml version="1.0" encoding="utf-8"?>
 <p:sld xmlns:a="http://schemas.openxmlformats.org/drawingml/2006/main" xmlns:r="http://schemas.openxmlformats.org/officeDocument/2006/relationships" xmlns:p="http://schemas.openxmlformats.org/presentationml/2006/main">
   <p:cSld>
     <p:spTree>
@@ -6760,6 +6140,807 @@
 </p:sld>
 </file>
 
+<file path=ppt/slides/slide12.xml><?xml version="1.0" encoding="utf-8"?>
+<p:sld xmlns:a="http://schemas.openxmlformats.org/drawingml/2006/main" xmlns:r="http://schemas.openxmlformats.org/officeDocument/2006/relationships" xmlns:p="http://schemas.openxmlformats.org/presentationml/2006/main">
+  <p:cSld>
+    <p:spTree>
+      <p:nvGrpSpPr>
+        <p:cNvPr id="1" name=""/>
+        <p:cNvGrpSpPr/>
+        <p:nvPr/>
+      </p:nvGrpSpPr>
+      <p:grpSpPr>
+        <a:xfrm>
+          <a:off x="0" y="0"/>
+          <a:ext cx="0" cy="0"/>
+          <a:chOff x="0" y="0"/>
+          <a:chExt cx="0" cy="0"/>
+        </a:xfrm>
+      </p:grpSpPr>
+      <p:sp>
+        <p:nvSpPr>
+          <p:cNvPr id="2" name="Title 1"/>
+          <p:cNvSpPr>
+            <a:spLocks noGrp="1"/>
+          </p:cNvSpPr>
+          <p:nvPr>
+            <p:ph type="title"/>
+          </p:nvPr>
+        </p:nvSpPr>
+        <p:spPr/>
+        <p:txBody>
+          <a:bodyPr/>
+          <a:lstStyle/>
+          <a:p>
+            <a:endParaRPr lang="en-US"/>
+          </a:p>
+        </p:txBody>
+      </p:sp>
+      <p:sp>
+        <p:nvSpPr>
+          <p:cNvPr id="3" name="Content Placeholder 2"/>
+          <p:cNvSpPr>
+            <a:spLocks noGrp="1"/>
+          </p:cNvSpPr>
+          <p:nvPr>
+            <p:ph idx="1"/>
+          </p:nvPr>
+        </p:nvSpPr>
+        <p:spPr/>
+        <p:txBody>
+          <a:bodyPr/>
+          <a:lstStyle/>
+          <a:p>
+            <a:endParaRPr lang="en-US"/>
+          </a:p>
+        </p:txBody>
+      </p:sp>
+    </p:spTree>
+    <p:extLst>
+      <p:ext uri="{BB962C8B-B14F-4D97-AF65-F5344CB8AC3E}">
+        <p14:creationId xmlns:p14="http://schemas.microsoft.com/office/powerpoint/2010/main" val="3224321568"/>
+      </p:ext>
+    </p:extLst>
+  </p:cSld>
+  <p:clrMapOvr>
+    <a:masterClrMapping/>
+  </p:clrMapOvr>
+</p:sld>
+</file>
+
+<file path=ppt/slides/slide2.xml><?xml version="1.0" encoding="utf-8"?>
+<p:sld xmlns:a="http://schemas.openxmlformats.org/drawingml/2006/main" xmlns:r="http://schemas.openxmlformats.org/officeDocument/2006/relationships" xmlns:p="http://schemas.openxmlformats.org/presentationml/2006/main">
+  <p:cSld>
+    <p:spTree>
+      <p:nvGrpSpPr>
+        <p:cNvPr id="1" name=""/>
+        <p:cNvGrpSpPr/>
+        <p:nvPr/>
+      </p:nvGrpSpPr>
+      <p:grpSpPr>
+        <a:xfrm>
+          <a:off x="0" y="0"/>
+          <a:ext cx="0" cy="0"/>
+          <a:chOff x="0" y="0"/>
+          <a:chExt cx="0" cy="0"/>
+        </a:xfrm>
+      </p:grpSpPr>
+      <p:sp>
+        <p:nvSpPr>
+          <p:cNvPr id="2" name="Title 1"/>
+          <p:cNvSpPr>
+            <a:spLocks noGrp="1"/>
+          </p:cNvSpPr>
+          <p:nvPr>
+            <p:ph type="title"/>
+          </p:nvPr>
+        </p:nvSpPr>
+        <p:spPr/>
+        <p:txBody>
+          <a:bodyPr/>
+          <a:lstStyle/>
+          <a:p>
+            <a:r>
+              <a:rPr lang="en-US" dirty="0"/>
+              <a:t>Topics</a:t>
+            </a:r>
+          </a:p>
+        </p:txBody>
+      </p:sp>
+      <p:sp>
+        <p:nvSpPr>
+          <p:cNvPr id="3" name="Content Placeholder 2"/>
+          <p:cNvSpPr>
+            <a:spLocks noGrp="1"/>
+          </p:cNvSpPr>
+          <p:nvPr>
+            <p:ph idx="1"/>
+          </p:nvPr>
+        </p:nvSpPr>
+        <p:spPr/>
+        <p:txBody>
+          <a:bodyPr/>
+          <a:lstStyle/>
+          <a:p>
+            <a:r>
+              <a:rPr lang="en-US" dirty="0"/>
+              <a:t>What is Machine Learning?</a:t>
+            </a:r>
+          </a:p>
+          <a:p>
+            <a:r>
+              <a:rPr lang="en-US" dirty="0"/>
+              <a:t>Types of Machine Learning</a:t>
+            </a:r>
+          </a:p>
+          <a:p>
+            <a:pPr lvl="1"/>
+            <a:r>
+              <a:rPr lang="en-US" dirty="0"/>
+              <a:t>Regression</a:t>
+            </a:r>
+          </a:p>
+          <a:p>
+            <a:pPr lvl="1"/>
+            <a:r>
+              <a:rPr lang="en-US" dirty="0"/>
+              <a:t>Classification</a:t>
+            </a:r>
+          </a:p>
+          <a:p>
+            <a:r>
+              <a:rPr lang="en-US" dirty="0"/>
+              <a:t>Considerations</a:t>
+            </a:r>
+          </a:p>
+          <a:p>
+            <a:pPr lvl="1"/>
+            <a:r>
+              <a:rPr lang="en-US" dirty="0"/>
+              <a:t>Overfitting</a:t>
+            </a:r>
+          </a:p>
+          <a:p>
+            <a:pPr lvl="1"/>
+            <a:r>
+              <a:rPr lang="en-US" dirty="0"/>
+              <a:t>Regularizing</a:t>
+            </a:r>
+          </a:p>
+          <a:p>
+            <a:endParaRPr lang="en-US" dirty="0"/>
+          </a:p>
+        </p:txBody>
+      </p:sp>
+    </p:spTree>
+    <p:extLst>
+      <p:ext uri="{BB962C8B-B14F-4D97-AF65-F5344CB8AC3E}">
+        <p14:creationId xmlns:p14="http://schemas.microsoft.com/office/powerpoint/2010/main" val="3658882410"/>
+      </p:ext>
+    </p:extLst>
+  </p:cSld>
+  <p:clrMapOvr>
+    <a:masterClrMapping/>
+  </p:clrMapOvr>
+</p:sld>
+</file>
+
+<file path=ppt/slides/slide3.xml><?xml version="1.0" encoding="utf-8"?>
+<p:sld xmlns:a="http://schemas.openxmlformats.org/drawingml/2006/main" xmlns:r="http://schemas.openxmlformats.org/officeDocument/2006/relationships" xmlns:p="http://schemas.openxmlformats.org/presentationml/2006/main">
+  <p:cSld>
+    <p:spTree>
+      <p:nvGrpSpPr>
+        <p:cNvPr id="1" name=""/>
+        <p:cNvGrpSpPr/>
+        <p:nvPr/>
+      </p:nvGrpSpPr>
+      <p:grpSpPr>
+        <a:xfrm>
+          <a:off x="0" y="0"/>
+          <a:ext cx="0" cy="0"/>
+          <a:chOff x="0" y="0"/>
+          <a:chExt cx="0" cy="0"/>
+        </a:xfrm>
+      </p:grpSpPr>
+      <p:sp>
+        <p:nvSpPr>
+          <p:cNvPr id="2" name="Title 1"/>
+          <p:cNvSpPr>
+            <a:spLocks noGrp="1"/>
+          </p:cNvSpPr>
+          <p:nvPr>
+            <p:ph type="title"/>
+          </p:nvPr>
+        </p:nvSpPr>
+        <p:spPr/>
+        <p:txBody>
+          <a:bodyPr/>
+          <a:lstStyle/>
+          <a:p>
+            <a:r>
+              <a:rPr lang="en-US" dirty="0"/>
+              <a:t>Mission</a:t>
+            </a:r>
+          </a:p>
+        </p:txBody>
+      </p:sp>
+      <p:sp>
+        <p:nvSpPr>
+          <p:cNvPr id="3" name="Content Placeholder 2"/>
+          <p:cNvSpPr>
+            <a:spLocks noGrp="1"/>
+          </p:cNvSpPr>
+          <p:nvPr>
+            <p:ph idx="1"/>
+          </p:nvPr>
+        </p:nvSpPr>
+        <p:spPr/>
+        <p:txBody>
+          <a:bodyPr/>
+          <a:lstStyle/>
+          <a:p>
+            <a:r>
+              <a:rPr lang="en-US" dirty="0"/>
+              <a:t>In this workshop we will give you a quick demo into Machine Learning </a:t>
+            </a:r>
+            <a:r>
+              <a:rPr lang="en-US"/>
+              <a:t>using Python</a:t>
+            </a:r>
+          </a:p>
+        </p:txBody>
+      </p:sp>
+    </p:spTree>
+    <p:extLst>
+      <p:ext uri="{BB962C8B-B14F-4D97-AF65-F5344CB8AC3E}">
+        <p14:creationId xmlns:p14="http://schemas.microsoft.com/office/powerpoint/2010/main" val="4171855284"/>
+      </p:ext>
+    </p:extLst>
+  </p:cSld>
+  <p:clrMapOvr>
+    <a:masterClrMapping/>
+  </p:clrMapOvr>
+</p:sld>
+</file>
+
+<file path=ppt/slides/slide4.xml><?xml version="1.0" encoding="utf-8"?>
+<p:sld xmlns:a="http://schemas.openxmlformats.org/drawingml/2006/main" xmlns:r="http://schemas.openxmlformats.org/officeDocument/2006/relationships" xmlns:p="http://schemas.openxmlformats.org/presentationml/2006/main">
+  <p:cSld>
+    <p:spTree>
+      <p:nvGrpSpPr>
+        <p:cNvPr id="1" name=""/>
+        <p:cNvGrpSpPr/>
+        <p:nvPr/>
+      </p:nvGrpSpPr>
+      <p:grpSpPr>
+        <a:xfrm>
+          <a:off x="0" y="0"/>
+          <a:ext cx="0" cy="0"/>
+          <a:chOff x="0" y="0"/>
+          <a:chExt cx="0" cy="0"/>
+        </a:xfrm>
+      </p:grpSpPr>
+      <p:sp>
+        <p:nvSpPr>
+          <p:cNvPr id="2" name="Title 1"/>
+          <p:cNvSpPr>
+            <a:spLocks noGrp="1"/>
+          </p:cNvSpPr>
+          <p:nvPr>
+            <p:ph type="title"/>
+          </p:nvPr>
+        </p:nvSpPr>
+        <p:spPr/>
+        <p:txBody>
+          <a:bodyPr/>
+          <a:lstStyle/>
+          <a:p>
+            <a:r>
+              <a:rPr lang="en-US" dirty="0"/>
+              <a:t>What is Machine Learning</a:t>
+            </a:r>
+          </a:p>
+        </p:txBody>
+      </p:sp>
+      <p:sp>
+        <p:nvSpPr>
+          <p:cNvPr id="3" name="Content Placeholder 2"/>
+          <p:cNvSpPr>
+            <a:spLocks noGrp="1"/>
+          </p:cNvSpPr>
+          <p:nvPr>
+            <p:ph idx="1"/>
+          </p:nvPr>
+        </p:nvSpPr>
+        <p:spPr/>
+        <p:txBody>
+          <a:bodyPr/>
+          <a:lstStyle/>
+          <a:p>
+            <a:r>
+              <a:rPr lang="en-US" dirty="0"/>
+              <a:t>Algorithms that improve performance through experience</a:t>
+            </a:r>
+          </a:p>
+        </p:txBody>
+      </p:sp>
+    </p:spTree>
+    <p:extLst>
+      <p:ext uri="{BB962C8B-B14F-4D97-AF65-F5344CB8AC3E}">
+        <p14:creationId xmlns:p14="http://schemas.microsoft.com/office/powerpoint/2010/main" val="2654504915"/>
+      </p:ext>
+    </p:extLst>
+  </p:cSld>
+  <p:clrMapOvr>
+    <a:masterClrMapping/>
+  </p:clrMapOvr>
+</p:sld>
+</file>
+
+<file path=ppt/slides/slide5.xml><?xml version="1.0" encoding="utf-8"?>
+<p:sld xmlns:a="http://schemas.openxmlformats.org/drawingml/2006/main" xmlns:r="http://schemas.openxmlformats.org/officeDocument/2006/relationships" xmlns:p="http://schemas.openxmlformats.org/presentationml/2006/main">
+  <p:cSld>
+    <p:spTree>
+      <p:nvGrpSpPr>
+        <p:cNvPr id="1" name=""/>
+        <p:cNvGrpSpPr/>
+        <p:nvPr/>
+      </p:nvGrpSpPr>
+      <p:grpSpPr>
+        <a:xfrm>
+          <a:off x="0" y="0"/>
+          <a:ext cx="0" cy="0"/>
+          <a:chOff x="0" y="0"/>
+          <a:chExt cx="0" cy="0"/>
+        </a:xfrm>
+      </p:grpSpPr>
+      <p:sp>
+        <p:nvSpPr>
+          <p:cNvPr id="2" name="Title 1"/>
+          <p:cNvSpPr>
+            <a:spLocks noGrp="1"/>
+          </p:cNvSpPr>
+          <p:nvPr>
+            <p:ph type="title"/>
+          </p:nvPr>
+        </p:nvSpPr>
+        <p:spPr/>
+        <p:txBody>
+          <a:bodyPr/>
+          <a:lstStyle/>
+          <a:p>
+            <a:r>
+              <a:rPr lang="en-US" dirty="0"/>
+              <a:t>What is Machine Learning</a:t>
+            </a:r>
+          </a:p>
+        </p:txBody>
+      </p:sp>
+      <p:sp>
+        <p:nvSpPr>
+          <p:cNvPr id="3" name="Content Placeholder 2"/>
+          <p:cNvSpPr>
+            <a:spLocks noGrp="1"/>
+          </p:cNvSpPr>
+          <p:nvPr>
+            <p:ph idx="1"/>
+          </p:nvPr>
+        </p:nvSpPr>
+        <p:spPr/>
+        <p:txBody>
+          <a:bodyPr/>
+          <a:lstStyle/>
+          <a:p>
+            <a:r>
+              <a:rPr lang="en-US" dirty="0"/>
+              <a:t>Some Terminology</a:t>
+            </a:r>
+          </a:p>
+          <a:p>
+            <a:pPr lvl="1"/>
+            <a:r>
+              <a:rPr lang="en-US" dirty="0"/>
+              <a:t>Input (x). This is the input data we feed into a ML model</a:t>
+            </a:r>
+          </a:p>
+          <a:p>
+            <a:pPr lvl="1"/>
+            <a:r>
+              <a:rPr lang="en-US" dirty="0"/>
+              <a:t>Target (t). These represent the “answers” to training</a:t>
+            </a:r>
+          </a:p>
+          <a:p>
+            <a:pPr lvl="1"/>
+            <a:r>
+              <a:rPr lang="en-US" dirty="0"/>
+              <a:t>Weights or parameters (w)</a:t>
+            </a:r>
+          </a:p>
+          <a:p>
+            <a:endParaRPr lang="en-US" dirty="0"/>
+          </a:p>
+          <a:p>
+            <a:endParaRPr lang="en-US" dirty="0"/>
+          </a:p>
+        </p:txBody>
+      </p:sp>
+    </p:spTree>
+    <p:extLst>
+      <p:ext uri="{BB962C8B-B14F-4D97-AF65-F5344CB8AC3E}">
+        <p14:creationId xmlns:p14="http://schemas.microsoft.com/office/powerpoint/2010/main" val="2985044466"/>
+      </p:ext>
+    </p:extLst>
+  </p:cSld>
+  <p:clrMapOvr>
+    <a:masterClrMapping/>
+  </p:clrMapOvr>
+</p:sld>
+</file>
+
+<file path=ppt/slides/slide6.xml><?xml version="1.0" encoding="utf-8"?>
+<p:sld xmlns:a="http://schemas.openxmlformats.org/drawingml/2006/main" xmlns:r="http://schemas.openxmlformats.org/officeDocument/2006/relationships" xmlns:p="http://schemas.openxmlformats.org/presentationml/2006/main">
+  <p:cSld>
+    <p:spTree>
+      <p:nvGrpSpPr>
+        <p:cNvPr id="1" name=""/>
+        <p:cNvGrpSpPr/>
+        <p:nvPr/>
+      </p:nvGrpSpPr>
+      <p:grpSpPr>
+        <a:xfrm>
+          <a:off x="0" y="0"/>
+          <a:ext cx="0" cy="0"/>
+          <a:chOff x="0" y="0"/>
+          <a:chExt cx="0" cy="0"/>
+        </a:xfrm>
+      </p:grpSpPr>
+      <p:sp>
+        <p:nvSpPr>
+          <p:cNvPr id="2" name="Title 1"/>
+          <p:cNvSpPr>
+            <a:spLocks noGrp="1"/>
+          </p:cNvSpPr>
+          <p:nvPr>
+            <p:ph type="title"/>
+          </p:nvPr>
+        </p:nvSpPr>
+        <p:spPr/>
+        <p:txBody>
+          <a:bodyPr/>
+          <a:lstStyle/>
+          <a:p>
+            <a:r>
+              <a:rPr lang="en-US" dirty="0"/>
+              <a:t>Types of Machine Learning</a:t>
+            </a:r>
+          </a:p>
+        </p:txBody>
+      </p:sp>
+    </p:spTree>
+    <p:extLst>
+      <p:ext uri="{BB962C8B-B14F-4D97-AF65-F5344CB8AC3E}">
+        <p14:creationId xmlns:p14="http://schemas.microsoft.com/office/powerpoint/2010/main" val="3378451331"/>
+      </p:ext>
+    </p:extLst>
+  </p:cSld>
+  <p:clrMapOvr>
+    <a:masterClrMapping/>
+  </p:clrMapOvr>
+</p:sld>
+</file>
+
+<file path=ppt/slides/slide7.xml><?xml version="1.0" encoding="utf-8"?>
+<p:sld xmlns:a="http://schemas.openxmlformats.org/drawingml/2006/main" xmlns:r="http://schemas.openxmlformats.org/officeDocument/2006/relationships" xmlns:p="http://schemas.openxmlformats.org/presentationml/2006/main">
+  <p:cSld>
+    <p:spTree>
+      <p:nvGrpSpPr>
+        <p:cNvPr id="1" name=""/>
+        <p:cNvGrpSpPr/>
+        <p:nvPr/>
+      </p:nvGrpSpPr>
+      <p:grpSpPr>
+        <a:xfrm>
+          <a:off x="0" y="0"/>
+          <a:ext cx="0" cy="0"/>
+          <a:chOff x="0" y="0"/>
+          <a:chExt cx="0" cy="0"/>
+        </a:xfrm>
+      </p:grpSpPr>
+      <p:sp>
+        <p:nvSpPr>
+          <p:cNvPr id="3" name="Title 2"/>
+          <p:cNvSpPr>
+            <a:spLocks noGrp="1"/>
+          </p:cNvSpPr>
+          <p:nvPr>
+            <p:ph type="title"/>
+          </p:nvPr>
+        </p:nvSpPr>
+        <p:spPr/>
+        <p:txBody>
+          <a:bodyPr/>
+          <a:lstStyle/>
+          <a:p>
+            <a:r>
+              <a:rPr lang="en-US" dirty="0"/>
+              <a:t>Regression</a:t>
+            </a:r>
+          </a:p>
+        </p:txBody>
+      </p:sp>
+      <p:sp>
+        <p:nvSpPr>
+          <p:cNvPr id="4" name="Content Placeholder 3"/>
+          <p:cNvSpPr>
+            <a:spLocks noGrp="1"/>
+          </p:cNvSpPr>
+          <p:nvPr>
+            <p:ph idx="1"/>
+          </p:nvPr>
+        </p:nvSpPr>
+        <p:spPr/>
+        <p:txBody>
+          <a:bodyPr/>
+          <a:lstStyle/>
+          <a:p>
+            <a:r>
+              <a:rPr lang="en-US" dirty="0"/>
+              <a:t>Like fitting a </a:t>
+            </a:r>
+            <a:r>
+              <a:rPr lang="en-US" dirty="0" err="1"/>
+              <a:t>trendline</a:t>
+            </a:r>
+            <a:r>
+              <a:rPr lang="en-US" dirty="0"/>
+              <a:t> through data points in Excel</a:t>
+            </a:r>
+          </a:p>
+          <a:p>
+            <a:r>
+              <a:rPr lang="en-US" dirty="0"/>
+              <a:t>We start with:</a:t>
+            </a:r>
+          </a:p>
+          <a:p>
+            <a:pPr lvl="1"/>
+            <a:r>
+              <a:rPr lang="en-US" dirty="0"/>
+              <a:t>Some existing points</a:t>
+            </a:r>
+          </a:p>
+          <a:p>
+            <a:pPr lvl="1"/>
+            <a:r>
+              <a:rPr lang="en-US" dirty="0"/>
+              <a:t>An estimate of the model structure (polynomial, sinusoid, other)</a:t>
+            </a:r>
+          </a:p>
+          <a:p>
+            <a:pPr lvl="2"/>
+            <a:r>
+              <a:rPr lang="en-US" dirty="0"/>
+              <a:t>I.E. y = mx + b. More generally: y = w</a:t>
+            </a:r>
+            <a:r>
+              <a:rPr lang="en-US" baseline="-25000" dirty="0"/>
+              <a:t>0</a:t>
+            </a:r>
+            <a:r>
+              <a:rPr lang="en-US" dirty="0"/>
+              <a:t> + w</a:t>
+            </a:r>
+            <a:r>
+              <a:rPr lang="en-US" baseline="-25000" dirty="0"/>
+              <a:t>1</a:t>
+            </a:r>
+            <a:r>
+              <a:rPr lang="en-US" dirty="0"/>
+              <a:t>x + w</a:t>
+            </a:r>
+            <a:r>
+              <a:rPr lang="en-US" baseline="-25000" dirty="0"/>
+              <a:t>2</a:t>
+            </a:r>
+            <a:r>
+              <a:rPr lang="en-US" dirty="0"/>
+              <a:t>x</a:t>
+            </a:r>
+            <a:r>
+              <a:rPr lang="en-US" baseline="30000" dirty="0"/>
+              <a:t>2</a:t>
+            </a:r>
+            <a:r>
+              <a:rPr lang="en-US" dirty="0"/>
+              <a:t> + w</a:t>
+            </a:r>
+            <a:r>
+              <a:rPr lang="en-US" baseline="-25000" dirty="0"/>
+              <a:t>3</a:t>
+            </a:r>
+            <a:r>
+              <a:rPr lang="en-US" dirty="0"/>
+              <a:t>x</a:t>
+            </a:r>
+            <a:r>
+              <a:rPr lang="en-US" baseline="30000" dirty="0"/>
+              <a:t>3</a:t>
+            </a:r>
+            <a:r>
+              <a:rPr lang="en-US" dirty="0"/>
+              <a:t> + … </a:t>
+            </a:r>
+            <a:r>
+              <a:rPr lang="en-US" dirty="0" err="1"/>
+              <a:t>w</a:t>
+            </a:r>
+            <a:r>
+              <a:rPr lang="en-US" baseline="-25000" dirty="0" err="1"/>
+              <a:t>n</a:t>
+            </a:r>
+            <a:r>
+              <a:rPr lang="en-US" dirty="0" err="1"/>
+              <a:t>x</a:t>
+            </a:r>
+            <a:r>
+              <a:rPr lang="en-US" baseline="30000" dirty="0" err="1"/>
+              <a:t>n</a:t>
+            </a:r>
+            <a:endParaRPr lang="en-US" dirty="0"/>
+          </a:p>
+          <a:p>
+            <a:r>
+              <a:rPr lang="en-US" dirty="0"/>
+              <a:t>We let the ML model determine the optimal weight values to solve our system</a:t>
+            </a:r>
+          </a:p>
+        </p:txBody>
+      </p:sp>
+      <p:pic>
+        <p:nvPicPr>
+          <p:cNvPr id="1026" name="Picture 2" descr="Linear regression.svg"/>
+          <p:cNvPicPr>
+            <a:picLocks noChangeAspect="1" noChangeArrowheads="1"/>
+          </p:cNvPicPr>
+          <p:nvPr/>
+        </p:nvPicPr>
+        <p:blipFill>
+          <a:blip r:embed="rId2">
+            <a:extLst>
+              <a:ext uri="{28A0092B-C50C-407E-A947-70E740481C1C}">
+                <a14:useLocalDpi xmlns:a14="http://schemas.microsoft.com/office/drawing/2010/main" val="0"/>
+              </a:ext>
+            </a:extLst>
+          </a:blip>
+          <a:srcRect/>
+          <a:stretch>
+            <a:fillRect/>
+          </a:stretch>
+        </p:blipFill>
+        <p:spPr bwMode="auto">
+          <a:xfrm>
+            <a:off x="6491804" y="1470026"/>
+            <a:ext cx="2926690" cy="1928956"/>
+          </a:xfrm>
+          <a:prstGeom prst="rect">
+            <a:avLst/>
+          </a:prstGeom>
+          <a:noFill/>
+          <a:extLst>
+            <a:ext uri="{909E8E84-426E-40DD-AFC4-6F175D3DCCD1}">
+              <a14:hiddenFill xmlns:a14="http://schemas.microsoft.com/office/drawing/2010/main">
+                <a:solidFill>
+                  <a:srgbClr val="FFFFFF"/>
+                </a:solidFill>
+              </a14:hiddenFill>
+            </a:ext>
+          </a:extLst>
+        </p:spPr>
+      </p:pic>
+    </p:spTree>
+    <p:extLst>
+      <p:ext uri="{BB962C8B-B14F-4D97-AF65-F5344CB8AC3E}">
+        <p14:creationId xmlns:p14="http://schemas.microsoft.com/office/powerpoint/2010/main" val="3671682612"/>
+      </p:ext>
+    </p:extLst>
+  </p:cSld>
+  <p:clrMapOvr>
+    <a:masterClrMapping/>
+  </p:clrMapOvr>
+</p:sld>
+</file>
+
+<file path=ppt/slides/slide8.xml><?xml version="1.0" encoding="utf-8"?>
+<p:sld xmlns:a="http://schemas.openxmlformats.org/drawingml/2006/main" xmlns:r="http://schemas.openxmlformats.org/officeDocument/2006/relationships" xmlns:p="http://schemas.openxmlformats.org/presentationml/2006/main">
+  <p:cSld>
+    <p:spTree>
+      <p:nvGrpSpPr>
+        <p:cNvPr id="1" name=""/>
+        <p:cNvGrpSpPr/>
+        <p:nvPr/>
+      </p:nvGrpSpPr>
+      <p:grpSpPr>
+        <a:xfrm>
+          <a:off x="0" y="0"/>
+          <a:ext cx="0" cy="0"/>
+          <a:chOff x="0" y="0"/>
+          <a:chExt cx="0" cy="0"/>
+        </a:xfrm>
+      </p:grpSpPr>
+      <p:sp>
+        <p:nvSpPr>
+          <p:cNvPr id="2" name="Title 1"/>
+          <p:cNvSpPr>
+            <a:spLocks noGrp="1"/>
+          </p:cNvSpPr>
+          <p:nvPr>
+            <p:ph type="title"/>
+          </p:nvPr>
+        </p:nvSpPr>
+        <p:spPr/>
+        <p:txBody>
+          <a:bodyPr/>
+          <a:lstStyle/>
+          <a:p>
+            <a:r>
+              <a:rPr lang="en-US" dirty="0" smtClean="0"/>
+              <a:t>Regression</a:t>
+            </a:r>
+            <a:endParaRPr lang="en-US" dirty="0"/>
+          </a:p>
+        </p:txBody>
+      </p:sp>
+      <p:sp>
+        <p:nvSpPr>
+          <p:cNvPr id="3" name="Content Placeholder 2"/>
+          <p:cNvSpPr>
+            <a:spLocks noGrp="1"/>
+          </p:cNvSpPr>
+          <p:nvPr>
+            <p:ph idx="1"/>
+          </p:nvPr>
+        </p:nvSpPr>
+        <p:spPr/>
+        <p:txBody>
+          <a:bodyPr/>
+          <a:lstStyle/>
+          <a:p>
+            <a:r>
+              <a:rPr lang="en-US" dirty="0" smtClean="0"/>
+              <a:t>How to do in </a:t>
+            </a:r>
+            <a:r>
+              <a:rPr lang="en-US" dirty="0" err="1" smtClean="0"/>
+              <a:t>sci</a:t>
+            </a:r>
+            <a:r>
+              <a:rPr lang="en-US" dirty="0" smtClean="0"/>
+              <a:t> kit learn </a:t>
+            </a:r>
+          </a:p>
+          <a:p>
+            <a:r>
+              <a:rPr lang="en-US" dirty="0" smtClean="0"/>
+              <a:t>Linear and polynomial regression</a:t>
+            </a:r>
+            <a:endParaRPr lang="en-US" dirty="0"/>
+          </a:p>
+        </p:txBody>
+      </p:sp>
+    </p:spTree>
+    <p:extLst>
+      <p:ext uri="{BB962C8B-B14F-4D97-AF65-F5344CB8AC3E}">
+        <p14:creationId xmlns:p14="http://schemas.microsoft.com/office/powerpoint/2010/main" val="560198768"/>
+      </p:ext>
+    </p:extLst>
+  </p:cSld>
+  <p:clrMapOvr>
+    <a:masterClrMapping/>
+  </p:clrMapOvr>
+</p:sld>
+</file>
+
 <file path=ppt/slides/slide9.xml><?xml version="1.0" encoding="utf-8"?>
 <p:sld xmlns:a="http://schemas.openxmlformats.org/drawingml/2006/main" xmlns:r="http://schemas.openxmlformats.org/officeDocument/2006/relationships" xmlns:p="http://schemas.openxmlformats.org/presentationml/2006/main">
   <p:cSld>
@@ -6792,7 +6973,10 @@
           <a:bodyPr/>
           <a:lstStyle/>
           <a:p>
-            <a:endParaRPr lang="en-US"/>
+            <a:r>
+              <a:rPr lang="en-US" dirty="0"/>
+              <a:t>Regression: Overfitting</a:t>
+            </a:r>
           </a:p>
         </p:txBody>
       </p:sp>
@@ -6811,14 +6995,77 @@
           <a:bodyPr/>
           <a:lstStyle/>
           <a:p>
-            <a:endParaRPr lang="en-US"/>
-          </a:p>
-        </p:txBody>
-      </p:sp>
+            <a:r>
+              <a:rPr lang="en-US" dirty="0"/>
+              <a:t>Why not use the highest order polynomial possible?</a:t>
+            </a:r>
+          </a:p>
+          <a:p>
+            <a:pPr lvl="1"/>
+            <a:r>
+              <a:rPr lang="en-US" dirty="0"/>
+              <a:t>Overfitting!</a:t>
+            </a:r>
+          </a:p>
+          <a:p>
+            <a:pPr lvl="1"/>
+            <a:r>
+              <a:rPr lang="en-US" dirty="0"/>
+              <a:t>We might fit the training data really well with a large order polynomial</a:t>
+            </a:r>
+          </a:p>
+          <a:p>
+            <a:pPr lvl="1"/>
+            <a:r>
+              <a:rPr lang="en-US" dirty="0"/>
+              <a:t>However the model may perform poorly against its test data</a:t>
+            </a:r>
+          </a:p>
+        </p:txBody>
+      </p:sp>
+      <p:pic>
+        <p:nvPicPr>
+          <p:cNvPr id="2050" name="Picture 2" descr="../_images/plot_underfitting_overfitting_0011.png"/>
+          <p:cNvPicPr>
+            <a:picLocks noChangeAspect="1" noChangeArrowheads="1"/>
+          </p:cNvPicPr>
+          <p:nvPr/>
+        </p:nvPicPr>
+        <p:blipFill rotWithShape="1">
+          <a:blip r:embed="rId2">
+            <a:extLst>
+              <a:ext uri="{28A0092B-C50C-407E-A947-70E740481C1C}">
+                <a14:useLocalDpi xmlns:a14="http://schemas.microsoft.com/office/drawing/2010/main" val="0"/>
+              </a:ext>
+            </a:extLst>
+          </a:blip>
+          <a:srcRect l="9351" r="7306"/>
+          <a:stretch/>
+        </p:blipFill>
+        <p:spPr bwMode="auto">
+          <a:xfrm>
+            <a:off x="677334" y="3978572"/>
+            <a:ext cx="7288497" cy="2498626"/>
+          </a:xfrm>
+          <a:prstGeom prst="rect">
+            <a:avLst/>
+          </a:prstGeom>
+          <a:noFill/>
+          <a:extLst>
+            <a:ext uri="{909E8E84-426E-40DD-AFC4-6F175D3DCCD1}">
+              <a14:hiddenFill xmlns:a14="http://schemas.microsoft.com/office/drawing/2010/main">
+                <a:solidFill>
+                  <a:srgbClr val="FFFFFF"/>
+                </a:solidFill>
+              </a14:hiddenFill>
+            </a:ext>
+          </a:extLst>
+        </p:spPr>
+      </p:pic>
     </p:spTree>
     <p:extLst>
       <p:ext uri="{BB962C8B-B14F-4D97-AF65-F5344CB8AC3E}">
-        <p14:creationId xmlns:p14="http://schemas.microsoft.com/office/powerpoint/2010/main" val="3224321568"/>
+        <p14:creationId xmlns:p14="http://schemas.microsoft.com/office/powerpoint/2010/main" val="2924641550"/>
       </p:ext>
     </p:extLst>
   </p:cSld>

</xml_diff>